<commit_message>
Updated ProductionProcess documentation slightly.
</commit_message>
<xml_diff>
--- a/Documentation/ProductionProcess.pptx
+++ b/Documentation/ProductionProcess.pptx
@@ -243,7 +243,7 @@
           <a:p>
             <a:fld id="{598FEA24-5A8D-41BA-8178-9D6F7B75066C}" type="datetimeFigureOut">
               <a:rPr lang="en-US" smtClean="0"/>
-              <a:t>2016-12-16</a:t>
+              <a:t>2017-01-11</a:t>
             </a:fld>
             <a:endParaRPr lang="en-US"/>
           </a:p>
@@ -413,7 +413,7 @@
           <a:p>
             <a:fld id="{598FEA24-5A8D-41BA-8178-9D6F7B75066C}" type="datetimeFigureOut">
               <a:rPr lang="en-US" smtClean="0"/>
-              <a:t>2016-12-16</a:t>
+              <a:t>2017-01-11</a:t>
             </a:fld>
             <a:endParaRPr lang="en-US"/>
           </a:p>
@@ -593,7 +593,7 @@
           <a:p>
             <a:fld id="{598FEA24-5A8D-41BA-8178-9D6F7B75066C}" type="datetimeFigureOut">
               <a:rPr lang="en-US" smtClean="0"/>
-              <a:t>2016-12-16</a:t>
+              <a:t>2017-01-11</a:t>
             </a:fld>
             <a:endParaRPr lang="en-US"/>
           </a:p>
@@ -763,7 +763,7 @@
           <a:p>
             <a:fld id="{598FEA24-5A8D-41BA-8178-9D6F7B75066C}" type="datetimeFigureOut">
               <a:rPr lang="en-US" smtClean="0"/>
-              <a:t>2016-12-16</a:t>
+              <a:t>2017-01-11</a:t>
             </a:fld>
             <a:endParaRPr lang="en-US"/>
           </a:p>
@@ -1009,7 +1009,7 @@
           <a:p>
             <a:fld id="{598FEA24-5A8D-41BA-8178-9D6F7B75066C}" type="datetimeFigureOut">
               <a:rPr lang="en-US" smtClean="0"/>
-              <a:t>2016-12-16</a:t>
+              <a:t>2017-01-11</a:t>
             </a:fld>
             <a:endParaRPr lang="en-US"/>
           </a:p>
@@ -1241,7 +1241,7 @@
           <a:p>
             <a:fld id="{598FEA24-5A8D-41BA-8178-9D6F7B75066C}" type="datetimeFigureOut">
               <a:rPr lang="en-US" smtClean="0"/>
-              <a:t>2016-12-16</a:t>
+              <a:t>2017-01-11</a:t>
             </a:fld>
             <a:endParaRPr lang="en-US"/>
           </a:p>
@@ -1608,7 +1608,7 @@
           <a:p>
             <a:fld id="{598FEA24-5A8D-41BA-8178-9D6F7B75066C}" type="datetimeFigureOut">
               <a:rPr lang="en-US" smtClean="0"/>
-              <a:t>2016-12-16</a:t>
+              <a:t>2017-01-11</a:t>
             </a:fld>
             <a:endParaRPr lang="en-US"/>
           </a:p>
@@ -1726,7 +1726,7 @@
           <a:p>
             <a:fld id="{598FEA24-5A8D-41BA-8178-9D6F7B75066C}" type="datetimeFigureOut">
               <a:rPr lang="en-US" smtClean="0"/>
-              <a:t>2016-12-16</a:t>
+              <a:t>2017-01-11</a:t>
             </a:fld>
             <a:endParaRPr lang="en-US"/>
           </a:p>
@@ -1821,7 +1821,7 @@
           <a:p>
             <a:fld id="{598FEA24-5A8D-41BA-8178-9D6F7B75066C}" type="datetimeFigureOut">
               <a:rPr lang="en-US" smtClean="0"/>
-              <a:t>2016-12-16</a:t>
+              <a:t>2017-01-11</a:t>
             </a:fld>
             <a:endParaRPr lang="en-US"/>
           </a:p>
@@ -2098,7 +2098,7 @@
           <a:p>
             <a:fld id="{598FEA24-5A8D-41BA-8178-9D6F7B75066C}" type="datetimeFigureOut">
               <a:rPr lang="en-US" smtClean="0"/>
-              <a:t>2016-12-16</a:t>
+              <a:t>2017-01-11</a:t>
             </a:fld>
             <a:endParaRPr lang="en-US"/>
           </a:p>
@@ -2351,7 +2351,7 @@
           <a:p>
             <a:fld id="{598FEA24-5A8D-41BA-8178-9D6F7B75066C}" type="datetimeFigureOut">
               <a:rPr lang="en-US" smtClean="0"/>
-              <a:t>2016-12-16</a:t>
+              <a:t>2017-01-11</a:t>
             </a:fld>
             <a:endParaRPr lang="en-US"/>
           </a:p>
@@ -2564,7 +2564,7 @@
           <a:p>
             <a:fld id="{598FEA24-5A8D-41BA-8178-9D6F7B75066C}" type="datetimeFigureOut">
               <a:rPr lang="en-US" smtClean="0"/>
-              <a:t>2016-12-16</a:t>
+              <a:t>2017-01-11</a:t>
             </a:fld>
             <a:endParaRPr lang="en-US"/>
           </a:p>
@@ -3077,7 +3077,7 @@
               <a:rPr lang="en-US" sz="1400" dirty="0" smtClean="0">
                 <a:latin typeface="+mj-lt"/>
               </a:rPr>
-              <a:t>The Penn Wharton Budget Model dynamic model team uses a distributed Git version control system to coordinate its development and production efforts.  Small-scale execution of the dynamic model is performed on the Wharton High Performance Computing Cluster (HPCC).  Large-scale execution is performed on the AWS Elastic Compute Cloud (EC2).  Both cluster and cloud execution of the model is managed through the Wharton HPCC, with execution capabilities available to all team members.</a:t>
+              <a:t>The Penn Wharton Budget Model dynamic model team uses a distributed Git version control system to coordinate its development and production efforts.  Small-scale execution of the dynamic model is performed on the Wharton High Performance Computing Cluster (HPCC).  Large-scale execution is performed on the AWS Elastic Compute Cloud (EC2).  Both cluster and cloud execution of the model are managed through the Wharton HPCC, with execution capabilities available to all team members.</a:t>
             </a:r>
             <a:endParaRPr lang="en-US" sz="1400" dirty="0">
               <a:latin typeface="+mj-lt"/>
@@ -5491,7 +5491,11 @@
               <a:pPr algn="ctr"/>
               <a:r>
                 <a:rPr lang="en-US" sz="1600" b="1" dirty="0" smtClean="0"/>
-                <a:t>Network drive</a:t>
+                <a:t>Network </a:t>
+              </a:r>
+              <a:r>
+                <a:rPr lang="en-US" sz="1600" b="1" dirty="0" smtClean="0"/>
+                <a:t>drives</a:t>
               </a:r>
               <a:endParaRPr lang="en-US" sz="1600" b="1" dirty="0"/>
             </a:p>
@@ -5804,19 +5808,7 @@
                 </a:solidFill>
                 <a:latin typeface="+mj-lt"/>
               </a:rPr>
-              <a:t>Pete | </a:t>
-            </a:r>
-            <a:r>
-              <a:rPr lang="en-US" sz="900" dirty="0" smtClean="0">
-                <a:solidFill>
-                  <a:schemeClr val="tx1">
-                    <a:lumMod val="50000"/>
-                    <a:lumOff val="50000"/>
-                  </a:schemeClr>
-                </a:solidFill>
-                <a:latin typeface="+mj-lt"/>
-              </a:rPr>
-              <a:t>2016-12-16</a:t>
+              <a:t>Pete | 2017-01-11</a:t>
             </a:r>
             <a:endParaRPr lang="en-US" sz="900" dirty="0">
               <a:solidFill>

</xml_diff>